<commit_message>
add tester and launch
</commit_message>
<xml_diff>
--- a/4-1 Review.pptx
+++ b/4-1 Review.pptx
@@ -5,7 +5,7 @@
     <p:sldMasterId id="2147483660" r:id="rId1"/>
   </p:sldMasterIdLst>
   <p:notesMasterIdLst>
-    <p:notesMasterId r:id="rId17"/>
+    <p:notesMasterId r:id="rId18"/>
   </p:notesMasterIdLst>
   <p:sldIdLst>
     <p:sldId id="256" r:id="rId2"/>
@@ -23,6 +23,7 @@
     <p:sldId id="288" r:id="rId14"/>
     <p:sldId id="289" r:id="rId15"/>
     <p:sldId id="290" r:id="rId16"/>
+    <p:sldId id="291" r:id="rId17"/>
   </p:sldIdLst>
   <p:sldSz cx="12192000" cy="6858000"/>
   <p:notesSz cx="6858000" cy="9144000"/>
@@ -14363,7 +14364,7 @@
           <a:p>
             <a:fld id="{82604E9E-60DE-417E-849E-2CDE7F357628}" type="datetimeFigureOut">
               <a:rPr lang="en-US" smtClean="0"/>
-              <a:t>8/4/2017</a:t>
+              <a:t>8/6/2017</a:t>
             </a:fld>
             <a:endParaRPr lang="en-US"/>
           </a:p>
@@ -15894,7 +15895,7 @@
           <a:p>
             <a:fld id="{0D913C1F-5111-45C8-8646-4E60C4FCFD33}" type="datetime1">
               <a:rPr lang="en-US" smtClean="0"/>
-              <a:t>8/4/2017</a:t>
+              <a:t>8/6/2017</a:t>
             </a:fld>
             <a:endParaRPr lang="en-US"/>
           </a:p>
@@ -16069,7 +16070,7 @@
           <a:p>
             <a:fld id="{D3A57730-C926-45F0-9361-C8E6CC7EFAB1}" type="datetime1">
               <a:rPr lang="en-US" smtClean="0"/>
-              <a:t>8/4/2017</a:t>
+              <a:t>8/6/2017</a:t>
             </a:fld>
             <a:endParaRPr lang="en-US"/>
           </a:p>
@@ -16249,7 +16250,7 @@
           <a:p>
             <a:fld id="{72F94769-6EA4-484E-8E33-A5D2CCD7F3B4}" type="datetime1">
               <a:rPr lang="en-US" smtClean="0"/>
-              <a:t>8/4/2017</a:t>
+              <a:t>8/6/2017</a:t>
             </a:fld>
             <a:endParaRPr lang="en-US"/>
           </a:p>
@@ -16419,7 +16420,7 @@
           <a:p>
             <a:fld id="{875CDD8C-CF5A-4DB3-98F8-3A2639B39FE9}" type="datetime1">
               <a:rPr lang="en-US" smtClean="0"/>
-              <a:t>8/4/2017</a:t>
+              <a:t>8/6/2017</a:t>
             </a:fld>
             <a:endParaRPr lang="en-US"/>
           </a:p>
@@ -16687,7 +16688,7 @@
           <a:p>
             <a:fld id="{73567B6B-69B5-4721-8DDE-4EEC9B6DCE0D}" type="datetime1">
               <a:rPr lang="en-US" smtClean="0"/>
-              <a:t>8/4/2017</a:t>
+              <a:t>8/6/2017</a:t>
             </a:fld>
             <a:endParaRPr lang="en-US"/>
           </a:p>
@@ -16919,7 +16920,7 @@
           <a:p>
             <a:fld id="{98DD2B97-22CE-4922-9B75-1DD88489AFD6}" type="datetime1">
               <a:rPr lang="en-US" smtClean="0"/>
-              <a:t>8/4/2017</a:t>
+              <a:t>8/6/2017</a:t>
             </a:fld>
             <a:endParaRPr lang="en-US"/>
           </a:p>
@@ -17278,7 +17279,7 @@
           <a:p>
             <a:fld id="{71335CB9-B160-4C99-9B3C-64E62B2B8AA1}" type="datetime1">
               <a:rPr lang="en-US" smtClean="0"/>
-              <a:t>8/4/2017</a:t>
+              <a:t>8/6/2017</a:t>
             </a:fld>
             <a:endParaRPr lang="en-US"/>
           </a:p>
@@ -17419,7 +17420,7 @@
           <a:p>
             <a:fld id="{AB5FD2A9-980D-4792-8107-6837CF22CACC}" type="datetime1">
               <a:rPr lang="en-US" smtClean="0"/>
-              <a:t>8/4/2017</a:t>
+              <a:t>8/6/2017</a:t>
             </a:fld>
             <a:endParaRPr lang="en-US"/>
           </a:p>
@@ -17514,7 +17515,7 @@
           <a:p>
             <a:fld id="{AE49ADA3-5F6C-44F2-923F-B96DDB41268F}" type="datetime1">
               <a:rPr lang="en-US" smtClean="0"/>
-              <a:t>8/4/2017</a:t>
+              <a:t>8/6/2017</a:t>
             </a:fld>
             <a:endParaRPr lang="en-US"/>
           </a:p>
@@ -17871,7 +17872,7 @@
           <a:p>
             <a:fld id="{CD641920-CFA1-454E-AD47-3EEEB5605BD0}" type="datetime1">
               <a:rPr lang="en-US" smtClean="0"/>
-              <a:t>8/4/2017</a:t>
+              <a:t>8/6/2017</a:t>
             </a:fld>
             <a:endParaRPr lang="en-US"/>
           </a:p>
@@ -18228,7 +18229,7 @@
           <a:p>
             <a:fld id="{F3A5C466-8A77-4A43-A9E6-B875AC354BDD}" type="datetime1">
               <a:rPr lang="en-US" smtClean="0"/>
-              <a:t>8/4/2017</a:t>
+              <a:t>8/6/2017</a:t>
             </a:fld>
             <a:endParaRPr lang="en-US"/>
           </a:p>
@@ -18469,7 +18470,7 @@
           <a:p>
             <a:fld id="{8C1F079E-EE37-4F70-8A6F-71D0624FBE44}" type="datetime1">
               <a:rPr lang="en-US" smtClean="0"/>
-              <a:t>8/4/2017</a:t>
+              <a:t>8/6/2017</a:t>
             </a:fld>
             <a:endParaRPr lang="en-US"/>
           </a:p>
@@ -21677,6 +21678,214 @@
 </p:sld>
 </file>
 
+<file path=ppt/slides/slide16.xml><?xml version="1.0" encoding="utf-8"?>
+<p:sld xmlns:a="http://schemas.openxmlformats.org/drawingml/2006/main" xmlns:r="http://schemas.openxmlformats.org/officeDocument/2006/relationships" xmlns:p="http://schemas.openxmlformats.org/presentationml/2006/main">
+  <p:cSld>
+    <p:spTree>
+      <p:nvGrpSpPr>
+        <p:cNvPr id="1" name=""/>
+        <p:cNvGrpSpPr/>
+        <p:nvPr/>
+      </p:nvGrpSpPr>
+      <p:grpSpPr>
+        <a:xfrm>
+          <a:off x="0" y="0"/>
+          <a:ext cx="0" cy="0"/>
+          <a:chOff x="0" y="0"/>
+          <a:chExt cx="0" cy="0"/>
+        </a:xfrm>
+      </p:grpSpPr>
+      <p:sp>
+        <p:nvSpPr>
+          <p:cNvPr id="2" name="제목 1">
+            <a:extLst>
+              <a:ext uri="{FF2B5EF4-FFF2-40B4-BE49-F238E27FC236}">
+                <a16:creationId xmlns:a16="http://schemas.microsoft.com/office/drawing/2014/main" id="{877938FD-F449-4DE6-915A-E2F91AA2C9B9}"/>
+              </a:ext>
+            </a:extLst>
+          </p:cNvPr>
+          <p:cNvSpPr>
+            <a:spLocks noGrp="1"/>
+          </p:cNvSpPr>
+          <p:nvPr>
+            <p:ph type="title"/>
+          </p:nvPr>
+        </p:nvSpPr>
+        <p:spPr>
+          <a:xfrm>
+            <a:off x="1411311" y="964692"/>
+            <a:ext cx="4567870" cy="1188720"/>
+          </a:xfrm>
+        </p:spPr>
+        <p:txBody>
+          <a:bodyPr/>
+          <a:lstStyle/>
+          <a:p>
+            <a:r>
+              <a:rPr lang="en-US" dirty="0"/>
+              <a:t>to Launch</a:t>
+            </a:r>
+          </a:p>
+        </p:txBody>
+      </p:sp>
+      <p:sp>
+        <p:nvSpPr>
+          <p:cNvPr id="3" name="내용 개체 틀 2">
+            <a:extLst>
+              <a:ext uri="{FF2B5EF4-FFF2-40B4-BE49-F238E27FC236}">
+                <a16:creationId xmlns:a16="http://schemas.microsoft.com/office/drawing/2014/main" id="{992C351A-46AF-4CB8-9C79-0E2B23CBE428}"/>
+              </a:ext>
+            </a:extLst>
+          </p:cNvPr>
+          <p:cNvSpPr>
+            <a:spLocks noGrp="1"/>
+          </p:cNvSpPr>
+          <p:nvPr>
+            <p:ph idx="1"/>
+          </p:nvPr>
+        </p:nvSpPr>
+        <p:spPr>
+          <a:xfrm>
+            <a:off x="1411311" y="2638044"/>
+            <a:ext cx="6352425" cy="3101983"/>
+          </a:xfrm>
+        </p:spPr>
+        <p:txBody>
+          <a:bodyPr/>
+          <a:lstStyle/>
+          <a:p>
+            <a:r>
+              <a:rPr lang="en-US" dirty="0"/>
+              <a:t>Add tester</a:t>
+            </a:r>
+            <a:br>
+              <a:rPr lang="en-US" dirty="0"/>
+            </a:br>
+            <a:r>
+              <a:rPr lang="en-US" dirty="0"/>
+              <a:t>Facebook Developer – Roles – Testers – Add testers</a:t>
+            </a:r>
+          </a:p>
+          <a:p>
+            <a:endParaRPr lang="en-US" dirty="0"/>
+          </a:p>
+          <a:p>
+            <a:r>
+              <a:rPr lang="en-US" dirty="0"/>
+              <a:t>Publish:</a:t>
+            </a:r>
+            <a:br>
+              <a:rPr lang="en-US" dirty="0"/>
+            </a:br>
+            <a:r>
+              <a:rPr lang="en-US" dirty="0"/>
+              <a:t>Facebook Developer – App Review – Make public</a:t>
+            </a:r>
+          </a:p>
+        </p:txBody>
+      </p:sp>
+      <p:sp>
+        <p:nvSpPr>
+          <p:cNvPr id="4" name="슬라이드 번호 개체 틀 3">
+            <a:extLst>
+              <a:ext uri="{FF2B5EF4-FFF2-40B4-BE49-F238E27FC236}">
+                <a16:creationId xmlns:a16="http://schemas.microsoft.com/office/drawing/2014/main" id="{1DFC96FD-CD43-45A2-921C-2E348DF9322B}"/>
+              </a:ext>
+            </a:extLst>
+          </p:cNvPr>
+          <p:cNvSpPr>
+            <a:spLocks noGrp="1"/>
+          </p:cNvSpPr>
+          <p:nvPr>
+            <p:ph type="sldNum" sz="quarter" idx="12"/>
+          </p:nvPr>
+        </p:nvSpPr>
+        <p:spPr/>
+        <p:txBody>
+          <a:bodyPr/>
+          <a:lstStyle/>
+          <a:p>
+            <a:fld id="{8B9A499C-E7AC-4E74-9635-A20519089A3A}" type="slidenum">
+              <a:rPr lang="en-US" smtClean="0"/>
+              <a:t>16</a:t>
+            </a:fld>
+            <a:endParaRPr lang="en-US"/>
+          </a:p>
+        </p:txBody>
+      </p:sp>
+      <p:pic>
+        <p:nvPicPr>
+          <p:cNvPr id="5" name="그림 4">
+            <a:extLst>
+              <a:ext uri="{FF2B5EF4-FFF2-40B4-BE49-F238E27FC236}">
+                <a16:creationId xmlns:a16="http://schemas.microsoft.com/office/drawing/2014/main" id="{35A79F80-15F1-4867-9414-B44661C81ED1}"/>
+              </a:ext>
+            </a:extLst>
+          </p:cNvPr>
+          <p:cNvPicPr>
+            <a:picLocks noChangeAspect="1"/>
+          </p:cNvPicPr>
+          <p:nvPr/>
+        </p:nvPicPr>
+        <p:blipFill>
+          <a:blip r:embed="rId2"/>
+          <a:stretch>
+            <a:fillRect/>
+          </a:stretch>
+        </p:blipFill>
+        <p:spPr>
+          <a:xfrm>
+            <a:off x="8176746" y="964692"/>
+            <a:ext cx="2648330" cy="2580206"/>
+          </a:xfrm>
+          <a:prstGeom prst="rect">
+            <a:avLst/>
+          </a:prstGeom>
+        </p:spPr>
+      </p:pic>
+      <p:pic>
+        <p:nvPicPr>
+          <p:cNvPr id="6" name="그림 5">
+            <a:extLst>
+              <a:ext uri="{FF2B5EF4-FFF2-40B4-BE49-F238E27FC236}">
+                <a16:creationId xmlns:a16="http://schemas.microsoft.com/office/drawing/2014/main" id="{9793070C-B620-436D-A700-D58C4818D659}"/>
+              </a:ext>
+            </a:extLst>
+          </p:cNvPr>
+          <p:cNvPicPr>
+            <a:picLocks noChangeAspect="1"/>
+          </p:cNvPicPr>
+          <p:nvPr/>
+        </p:nvPicPr>
+        <p:blipFill>
+          <a:blip r:embed="rId3"/>
+          <a:stretch>
+            <a:fillRect/>
+          </a:stretch>
+        </p:blipFill>
+        <p:spPr>
+          <a:xfrm>
+            <a:off x="6931742" y="3544898"/>
+            <a:ext cx="5138338" cy="949945"/>
+          </a:xfrm>
+          <a:prstGeom prst="rect">
+            <a:avLst/>
+          </a:prstGeom>
+        </p:spPr>
+      </p:pic>
+    </p:spTree>
+    <p:extLst>
+      <p:ext uri="{BB962C8B-B14F-4D97-AF65-F5344CB8AC3E}">
+        <p14:creationId xmlns:p14="http://schemas.microsoft.com/office/powerpoint/2010/main" val="3530818854"/>
+      </p:ext>
+    </p:extLst>
+  </p:cSld>
+  <p:clrMapOvr>
+    <a:masterClrMapping/>
+  </p:clrMapOvr>
+</p:sld>
+</file>
+
 <file path=ppt/slides/slide2.xml><?xml version="1.0" encoding="utf-8"?>
 <p:sld xmlns:a="http://schemas.openxmlformats.org/drawingml/2006/main" xmlns:r="http://schemas.openxmlformats.org/officeDocument/2006/relationships" xmlns:p="http://schemas.openxmlformats.org/presentationml/2006/main">
   <p:cSld>

</xml_diff>